<commit_message>
Tiny changes: - removed original (legacy) code - added original APLF article - update of the presentation
</commit_message>
<xml_diff>
--- a/docs/IngProj2_finalStatus.pptx
+++ b/docs/IngProj2_finalStatus.pptx
@@ -2889,13 +2889,8 @@
             <a:pPr lvl="1"/>
             <a:r>
               <a:rPr lang="sk-SK" dirty="0" smtClean="0"/>
-              <a:t>Druhá </a:t>
-            </a:r>
-            <a:r>
-              <a:rPr lang="sk-SK" dirty="0" smtClean="0"/>
-              <a:t>úroveň</a:t>
-            </a:r>
-            <a:endParaRPr lang="sk-SK" dirty="0" smtClean="0"/>
+              <a:t>Druhá úroveň</a:t>
+            </a:r>
           </a:p>
         </p:txBody>
       </p:sp>
@@ -3203,24 +3198,90 @@
             <p:ph type="ctrTitle"/>
           </p:nvPr>
         </p:nvSpPr>
-        <p:spPr/>
-        <p:txBody>
-          <a:bodyPr/>
-          <a:lstStyle/>
-          <a:p>
-            <a:r>
-              <a:rPr lang="en-US" dirty="0" err="1" smtClean="0"/>
+        <p:spPr>
+          <a:xfrm>
+            <a:off x="323528" y="1700808"/>
+            <a:ext cx="8568952" cy="2304255"/>
+          </a:xfrm>
+        </p:spPr>
+        <p:txBody>
+          <a:bodyPr/>
+          <a:lstStyle/>
+          <a:p>
+            <a:r>
+              <a:rPr lang="en-US" sz="6000" dirty="0" err="1" smtClean="0">
+                <a:effectLst>
+                  <a:outerShdw blurRad="38100" dist="38100" dir="2700000" algn="tl">
+                    <a:srgbClr val="000000">
+                      <a:alpha val="43137"/>
+                    </a:srgbClr>
+                  </a:outerShdw>
+                </a:effectLst>
+              </a:rPr>
               <a:t>Spr</a:t>
             </a:r>
             <a:r>
-              <a:rPr lang="sk-SK" dirty="0" err="1" smtClean="0"/>
+              <a:rPr lang="sk-SK" sz="6000" dirty="0" err="1" smtClean="0">
+                <a:effectLst>
+                  <a:outerShdw blurRad="38100" dist="38100" dir="2700000" algn="tl">
+                    <a:srgbClr val="000000">
+                      <a:alpha val="43137"/>
+                    </a:srgbClr>
+                  </a:outerShdw>
+                </a:effectLst>
+              </a:rPr>
               <a:t>áva</a:t>
             </a:r>
             <a:r>
-              <a:rPr lang="sk-SK" dirty="0" smtClean="0"/>
-              <a:t> o stave projektu na konci semestra</a:t>
-            </a:r>
-            <a:endParaRPr lang="sk-SK" dirty="0"/>
+              <a:rPr lang="sk-SK" sz="6000" dirty="0" smtClean="0">
+                <a:effectLst>
+                  <a:outerShdw blurRad="38100" dist="38100" dir="2700000" algn="tl">
+                    <a:srgbClr val="000000">
+                      <a:alpha val="43137"/>
+                    </a:srgbClr>
+                  </a:outerShdw>
+                </a:effectLst>
+              </a:rPr>
+              <a:t> o </a:t>
+            </a:r>
+            <a:r>
+              <a:rPr lang="sk-SK" sz="6000" dirty="0" smtClean="0">
+                <a:effectLst>
+                  <a:outerShdw blurRad="38100" dist="38100" dir="2700000" algn="tl">
+                    <a:srgbClr val="000000">
+                      <a:alpha val="43137"/>
+                    </a:srgbClr>
+                  </a:outerShdw>
+                </a:effectLst>
+              </a:rPr>
+              <a:t>finálnom stave </a:t>
+            </a:r>
+            <a:r>
+              <a:rPr lang="sk-SK" sz="6000" dirty="0" smtClean="0">
+                <a:solidFill>
+                  <a:schemeClr val="accent1">
+                    <a:lumMod val="75000"/>
+                  </a:schemeClr>
+                </a:solidFill>
+                <a:effectLst>
+                  <a:outerShdw blurRad="38100" dist="38100" dir="2700000" algn="tl">
+                    <a:srgbClr val="000000">
+                      <a:alpha val="43137"/>
+                    </a:srgbClr>
+                  </a:outerShdw>
+                </a:effectLst>
+              </a:rPr>
+              <a:t>Inžinierskeho projektu II</a:t>
+            </a:r>
+            <a:endParaRPr lang="sk-SK" sz="6000" dirty="0">
+              <a:effectLst>
+                <a:outerShdw blurRad="38100" dist="38100" dir="2700000" algn="tl">
+                  <a:srgbClr val="000000">
+                    <a:alpha val="43137"/>
+                  </a:srgbClr>
+                </a:outerShdw>
+              </a:effectLst>
+            </a:endParaRPr>
           </a:p>
         </p:txBody>
       </p:sp>
@@ -3314,7 +3375,7 @@
         </p:nvSpPr>
         <p:spPr>
           <a:xfrm>
-            <a:off x="179512" y="0"/>
+            <a:off x="107504" y="116632"/>
             <a:ext cx="8856984" cy="1556792"/>
           </a:xfrm>
         </p:spPr>
@@ -3342,8 +3403,8 @@
         </p:nvSpPr>
         <p:spPr>
           <a:xfrm>
-            <a:off x="179512" y="1700808"/>
-            <a:ext cx="8856984" cy="4824536"/>
+            <a:off x="179512" y="1844824"/>
+            <a:ext cx="8856984" cy="4680520"/>
           </a:xfrm>
         </p:spPr>
         <p:txBody>
@@ -3436,9 +3497,16 @@
             <p:ph idx="1"/>
           </p:nvPr>
         </p:nvSpPr>
-        <p:spPr/>
-        <p:txBody>
-          <a:bodyPr/>
+        <p:spPr>
+          <a:xfrm>
+            <a:off x="0" y="1628800"/>
+            <a:ext cx="9144000" cy="5112568"/>
+          </a:xfrm>
+        </p:spPr>
+        <p:txBody>
+          <a:bodyPr>
+            <a:normAutofit/>
+          </a:bodyPr>
           <a:lstStyle/>
           <a:p>
             <a:r>
@@ -3635,6 +3703,19 @@
           </a:p>
           <a:p>
             <a:r>
+              <a:rPr lang="sk-SK" b="1" dirty="0" smtClean="0">
+                <a:effectLst>
+                  <a:outerShdw blurRad="38100" dist="38100" dir="2700000" algn="tl">
+                    <a:srgbClr val="000000">
+                      <a:alpha val="43137"/>
+                    </a:srgbClr>
+                  </a:outerShdw>
+                </a:effectLst>
+                <a:hlinkClick r:id="rId2"/>
+              </a:rPr>
+              <a:t>https</a:t>
+            </a:r>
+            <a:r>
               <a:rPr lang="sk-SK" b="1" dirty="0">
                 <a:effectLst>
                   <a:outerShdw blurRad="38100" dist="38100" dir="2700000" algn="tl">
@@ -3643,9 +3724,150 @@
                     </a:srgbClr>
                   </a:outerShdw>
                 </a:effectLst>
+                <a:hlinkClick r:id="rId2"/>
               </a:rPr>
-              <a:t>https://github.com/Hawkie94/FRI_APLF</a:t>
-            </a:r>
+              <a:t>://</a:t>
+            </a:r>
+            <a:r>
+              <a:rPr lang="sk-SK" b="1" dirty="0" smtClean="0">
+                <a:effectLst>
+                  <a:outerShdw blurRad="38100" dist="38100" dir="2700000" algn="tl">
+                    <a:srgbClr val="000000">
+                      <a:alpha val="43137"/>
+                    </a:srgbClr>
+                  </a:outerShdw>
+                </a:effectLst>
+                <a:hlinkClick r:id="rId2"/>
+              </a:rPr>
+              <a:t>github.com/Hawkie94/FRI_APLF</a:t>
+            </a:r>
+            <a:endParaRPr lang="sk-SK" b="1" dirty="0" smtClean="0">
+              <a:effectLst>
+                <a:outerShdw blurRad="38100" dist="38100" dir="2700000" algn="tl">
+                  <a:srgbClr val="000000">
+                    <a:alpha val="43137"/>
+                  </a:srgbClr>
+                </a:outerShdw>
+              </a:effectLst>
+            </a:endParaRPr>
+          </a:p>
+          <a:p>
+            <a:pPr marL="0" indent="0">
+              <a:buNone/>
+            </a:pPr>
+            <a:endParaRPr lang="sk-SK" sz="1600" b="1" dirty="0" smtClean="0">
+              <a:effectLst>
+                <a:outerShdw blurRad="38100" dist="38100" dir="2700000" algn="tl">
+                  <a:srgbClr val="000000">
+                    <a:alpha val="43137"/>
+                  </a:srgbClr>
+                </a:outerShdw>
+              </a:effectLst>
+            </a:endParaRPr>
+          </a:p>
+          <a:p>
+            <a:pPr marL="0" indent="0">
+              <a:buNone/>
+            </a:pPr>
+            <a:endParaRPr lang="sk-SK" sz="1600" b="1" dirty="0">
+              <a:effectLst>
+                <a:outerShdw blurRad="38100" dist="38100" dir="2700000" algn="tl">
+                  <a:srgbClr val="000000">
+                    <a:alpha val="43137"/>
+                  </a:srgbClr>
+                </a:outerShdw>
+              </a:effectLst>
+            </a:endParaRPr>
+          </a:p>
+          <a:p>
+            <a:pPr marL="0" indent="0">
+              <a:buNone/>
+            </a:pPr>
+            <a:r>
+              <a:rPr lang="sk-SK" sz="1400" b="1" dirty="0" err="1" smtClean="0"/>
+              <a:t>Álvarez</a:t>
+            </a:r>
+            <a:r>
+              <a:rPr lang="sk-SK" sz="1400" b="1" dirty="0" smtClean="0"/>
+              <a:t>, </a:t>
+            </a:r>
+            <a:r>
+              <a:rPr lang="sk-SK" sz="1400" b="1" dirty="0" err="1" smtClean="0"/>
+              <a:t>Verónica</a:t>
+            </a:r>
+            <a:r>
+              <a:rPr lang="sk-SK" sz="1400" b="1" dirty="0" smtClean="0"/>
+              <a:t>, </a:t>
+            </a:r>
+            <a:r>
+              <a:rPr lang="sk-SK" sz="1400" b="1" dirty="0" err="1" smtClean="0"/>
+              <a:t>Mazuelas</a:t>
+            </a:r>
+            <a:r>
+              <a:rPr lang="sk-SK" sz="1400" b="1" dirty="0" smtClean="0"/>
+              <a:t>, Santiago, </a:t>
+            </a:r>
+            <a:r>
+              <a:rPr lang="sk-SK" sz="1400" b="1" dirty="0" err="1" smtClean="0"/>
+              <a:t>Lozano</a:t>
+            </a:r>
+            <a:r>
+              <a:rPr lang="sk-SK" sz="1400" b="1" dirty="0" smtClean="0"/>
+              <a:t>, José A. „</a:t>
+            </a:r>
+            <a:r>
+              <a:rPr lang="en-US" sz="1400" b="1" i="1" dirty="0" smtClean="0"/>
+              <a:t>Probabilistic </a:t>
+            </a:r>
+            <a:r>
+              <a:rPr lang="en-US" sz="1400" b="1" i="1" dirty="0"/>
+              <a:t>Load Forecasting Based on Adaptive Online </a:t>
+            </a:r>
+            <a:r>
+              <a:rPr lang="en-US" sz="1400" b="1" i="1" dirty="0" smtClean="0"/>
+              <a:t>Learning</a:t>
+            </a:r>
+            <a:r>
+              <a:rPr lang="sk-SK" sz="1400" b="1" i="1" dirty="0" smtClean="0"/>
+              <a:t>“. </a:t>
+            </a:r>
+            <a:r>
+              <a:rPr lang="sk-SK" sz="1400" b="1" dirty="0" err="1" smtClean="0"/>
+              <a:t>June</a:t>
+            </a:r>
+            <a:r>
+              <a:rPr lang="sk-SK" sz="1400" b="1" dirty="0"/>
+              <a:t> 2021. </a:t>
+            </a:r>
+            <a:r>
+              <a:rPr lang="sk-SK" sz="1400" b="1" dirty="0" smtClean="0"/>
+              <a:t>Dostupné </a:t>
+            </a:r>
+            <a:r>
+              <a:rPr lang="sk-SK" sz="1400" b="1" dirty="0" err="1" smtClean="0"/>
+              <a:t>online</a:t>
+            </a:r>
+            <a:r>
+              <a:rPr lang="sk-SK" sz="1400" b="1" dirty="0" smtClean="0"/>
+              <a:t> na: https</a:t>
+            </a:r>
+            <a:r>
+              <a:rPr lang="sk-SK" sz="1400" b="1" dirty="0"/>
+              <a:t>://</a:t>
+            </a:r>
+            <a:r>
+              <a:rPr lang="sk-SK" sz="1400" b="1" dirty="0" smtClean="0"/>
+              <a:t>doi.org/10.1109/TPWRS.2021.3050837</a:t>
+            </a:r>
+            <a:endParaRPr lang="sk-SK" sz="1600" b="1" dirty="0" smtClean="0">
+              <a:effectLst>
+                <a:outerShdw blurRad="38100" dist="38100" dir="2700000" algn="tl">
+                  <a:srgbClr val="000000">
+                    <a:alpha val="43137"/>
+                  </a:srgbClr>
+                </a:outerShdw>
+              </a:effectLst>
+            </a:endParaRPr>
           </a:p>
         </p:txBody>
       </p:sp>
@@ -3770,7 +3992,24 @@
                   </a:outerShdw>
                 </a:effectLst>
               </a:rPr>
-              <a:t>Hierarchický prístup</a:t>
+              <a:t>(metodologický spôsob) – Hierarchický </a:t>
+            </a:r>
+            <a:r>
+              <a:rPr lang="sk-SK" sz="2800" b="1" dirty="0" smtClean="0">
+                <a:solidFill>
+                  <a:schemeClr val="bg2">
+                    <a:lumMod val="50000"/>
+                  </a:schemeClr>
+                </a:solidFill>
+                <a:effectLst>
+                  <a:outerShdw blurRad="38100" dist="38100" dir="2700000" algn="tl">
+                    <a:srgbClr val="000000">
+                      <a:alpha val="43137"/>
+                    </a:srgbClr>
+                  </a:outerShdw>
+                </a:effectLst>
+              </a:rPr>
+              <a:t>prístup</a:t>
             </a:r>
           </a:p>
           <a:p>
@@ -3778,6 +4017,23 @@
               <a:buFont typeface="+mj-lt"/>
               <a:buAutoNum type="arabicPeriod"/>
             </a:pPr>
+            <a:r>
+              <a:rPr lang="sk-SK" sz="2800" b="1" dirty="0" smtClean="0">
+                <a:solidFill>
+                  <a:schemeClr val="bg2">
+                    <a:lumMod val="50000"/>
+                  </a:schemeClr>
+                </a:solidFill>
+                <a:effectLst>
+                  <a:outerShdw blurRad="38100" dist="38100" dir="2700000" algn="tl">
+                    <a:srgbClr val="000000">
+                      <a:alpha val="43137"/>
+                    </a:srgbClr>
+                  </a:outerShdw>
+                </a:effectLst>
+              </a:rPr>
+              <a:t>(implementačný spôsob) – </a:t>
+            </a:r>
             <a:r>
               <a:rPr lang="sk-SK" sz="2800" b="1" dirty="0" err="1" smtClean="0">
                 <a:solidFill>
@@ -4026,7 +4282,58 @@
                   </a:outerShdw>
                 </a:effectLst>
               </a:rPr>
-              <a:t>Vyčlenenie jednoznačného spôsobu spracovania a načítania (</a:t>
+              <a:t>Vyčlenenie jednoznačného </a:t>
+            </a:r>
+            <a:r>
+              <a:rPr lang="sk-SK" sz="2800" b="1" dirty="0" smtClean="0">
+                <a:solidFill>
+                  <a:schemeClr val="accent1">
+                    <a:lumMod val="75000"/>
+                  </a:schemeClr>
+                </a:solidFill>
+                <a:effectLst>
+                  <a:outerShdw blurRad="38100" dist="38100" dir="2700000" algn="tl">
+                    <a:srgbClr val="000000">
+                      <a:alpha val="43137"/>
+                    </a:srgbClr>
+                  </a:outerShdw>
+                </a:effectLst>
+              </a:rPr>
+              <a:t>(všeobecného) spôsobu </a:t>
+            </a:r>
+            <a:r>
+              <a:rPr lang="sk-SK" sz="2800" b="1" dirty="0" smtClean="0">
+                <a:solidFill>
+                  <a:schemeClr val="accent1">
+                    <a:lumMod val="75000"/>
+                  </a:schemeClr>
+                </a:solidFill>
+                <a:effectLst>
+                  <a:outerShdw blurRad="38100" dist="38100" dir="2700000" algn="tl">
+                    <a:srgbClr val="000000">
+                      <a:alpha val="43137"/>
+                    </a:srgbClr>
+                  </a:outerShdw>
+                </a:effectLst>
+              </a:rPr>
+              <a:t>spracovania a načítania </a:t>
+            </a:r>
+            <a:r>
+              <a:rPr lang="sk-SK" sz="2800" b="1" dirty="0" smtClean="0">
+                <a:solidFill>
+                  <a:schemeClr val="accent1">
+                    <a:lumMod val="75000"/>
+                  </a:schemeClr>
+                </a:solidFill>
+                <a:effectLst>
+                  <a:outerShdw blurRad="38100" dist="38100" dir="2700000" algn="tl">
+                    <a:srgbClr val="000000">
+                      <a:alpha val="43137"/>
+                    </a:srgbClr>
+                  </a:outerShdw>
+                </a:effectLst>
+              </a:rPr>
+              <a:t>dát (</a:t>
             </a:r>
             <a:r>
               <a:rPr lang="sk-SK" sz="2800" b="1" dirty="0" err="1" smtClean="0">
@@ -4060,7 +4367,24 @@
                   </a:outerShdw>
                 </a:effectLst>
               </a:rPr>
-              <a:t> aj </a:t>
+              <a:t> </a:t>
+            </a:r>
+            <a:r>
+              <a:rPr lang="sk-SK" sz="2800" b="1" dirty="0" smtClean="0">
+                <a:solidFill>
+                  <a:schemeClr val="accent1">
+                    <a:lumMod val="75000"/>
+                  </a:schemeClr>
+                </a:solidFill>
+                <a:effectLst>
+                  <a:outerShdw blurRad="38100" dist="38100" dir="2700000" algn="tl">
+                    <a:srgbClr val="000000">
+                      <a:alpha val="43137"/>
+                    </a:srgbClr>
+                  </a:outerShdw>
+                </a:effectLst>
+              </a:rPr>
+              <a:t>aj </a:t>
             </a:r>
             <a:r>
               <a:rPr lang="sk-SK" sz="2800" b="1" dirty="0" err="1" smtClean="0">

</xml_diff>